<commit_message>
Added consolidated slides v2
</commit_message>
<xml_diff>
--- a/ietf108/slides/ietf108-core.pptx
+++ b/ietf108/slides/ietf108-core.pptx
@@ -1727,7 +1727,7 @@
           </a:prstGeom>
           <a:extLst>
             <a:ext uri="{C572A759-6A51-4108-AA02-DFA0A04FC94B}">
-              <ma14:wrappingTextBoxFlag xmlns="" xmlns:m="http://schemas.openxmlformats.org/officeDocument/2006/math" xmlns:a14="http://schemas.microsoft.com/office/drawing/2010/main" xmlns:ma14="http://schemas.microsoft.com/office/mac/drawingml/2011/main" val="1"/>
+              <ma14:wrappingTextBoxFlag xmlns:ma14="http://schemas.microsoft.com/office/mac/drawingml/2011/main" xmlns:a14="http://schemas.microsoft.com/office/drawing/2010/main" xmlns:m="http://schemas.openxmlformats.org/officeDocument/2006/math" xmlns="" val="1"/>
             </a:ext>
           </a:extLst>
         </p:spPr>
@@ -3337,7 +3337,7 @@
           </a:prstGeom>
           <a:extLst>
             <a:ext uri="{C572A759-6A51-4108-AA02-DFA0A04FC94B}">
-              <ma14:wrappingTextBoxFlag xmlns="" xmlns:m="http://schemas.openxmlformats.org/officeDocument/2006/math" xmlns:a14="http://schemas.microsoft.com/office/drawing/2010/main" xmlns:ma14="http://schemas.microsoft.com/office/mac/drawingml/2011/main" val="1"/>
+              <ma14:wrappingTextBoxFlag xmlns:ma14="http://schemas.microsoft.com/office/mac/drawingml/2011/main" xmlns:a14="http://schemas.microsoft.com/office/drawing/2010/main" xmlns:m="http://schemas.openxmlformats.org/officeDocument/2006/math" xmlns="" val="1"/>
             </a:ext>
           </a:extLst>
         </p:spPr>
@@ -3373,7 +3373,7 @@
           </a:ln>
           <a:extLst>
             <a:ext uri="{C572A759-6A51-4108-AA02-DFA0A04FC94B}">
-              <ma14:wrappingTextBoxFlag xmlns="" xmlns:m="http://schemas.openxmlformats.org/officeDocument/2006/math" xmlns:a14="http://schemas.microsoft.com/office/drawing/2010/main" xmlns:ma14="http://schemas.microsoft.com/office/mac/drawingml/2011/main" val="1"/>
+              <ma14:wrappingTextBoxFlag xmlns:ma14="http://schemas.microsoft.com/office/mac/drawingml/2011/main" xmlns:a14="http://schemas.microsoft.com/office/drawing/2010/main" xmlns:m="http://schemas.openxmlformats.org/officeDocument/2006/math" xmlns="" val="1"/>
             </a:ext>
           </a:extLst>
         </p:spPr>
@@ -3706,7 +3706,7 @@
           </a:ln>
           <a:extLst>
             <a:ext uri="{C572A759-6A51-4108-AA02-DFA0A04FC94B}">
-              <ma14:wrappingTextBoxFlag xmlns="" xmlns:m="http://schemas.openxmlformats.org/officeDocument/2006/math" xmlns:a14="http://schemas.microsoft.com/office/drawing/2010/main" xmlns:ma14="http://schemas.microsoft.com/office/mac/drawingml/2011/main" val="1"/>
+              <ma14:wrappingTextBoxFlag xmlns:ma14="http://schemas.microsoft.com/office/mac/drawingml/2011/main" xmlns:a14="http://schemas.microsoft.com/office/drawing/2010/main" xmlns:m="http://schemas.openxmlformats.org/officeDocument/2006/math" xmlns="" val="1"/>
             </a:ext>
           </a:extLst>
         </p:spPr>
@@ -4622,7 +4622,7 @@
               <a:t>14</a:t>
             </a:r>
             <a:r>
-              <a:rPr sz="6600" b="0">
+              <a:rPr sz="6600" b="0" dirty="0">
                 <a:latin typeface="Calibri Light" panose="020F0302020204030204" pitchFamily="34" charset="0"/>
                 <a:cs typeface="Calibri Light" panose="020F0302020204030204" pitchFamily="34" charset="0"/>
               </a:rPr>
@@ -4636,7 +4636,7 @@
               <a:t>10</a:t>
             </a:r>
             <a:r>
-              <a:rPr sz="6600" b="0">
+              <a:rPr sz="6600" b="0" dirty="0">
                 <a:latin typeface="Calibri Light" panose="020F0302020204030204" pitchFamily="34" charset="0"/>
                 <a:cs typeface="Calibri Light" panose="020F0302020204030204" pitchFamily="34" charset="0"/>
               </a:rPr>
@@ -4650,7 +4650,7 @@
               <a:t>14</a:t>
             </a:r>
             <a:r>
-              <a:rPr sz="6600" b="0">
+              <a:rPr sz="6600" b="0" dirty="0">
                 <a:latin typeface="Calibri Light" panose="020F0302020204030204" pitchFamily="34" charset="0"/>
                 <a:cs typeface="Calibri Light" panose="020F0302020204030204" pitchFamily="34" charset="0"/>
               </a:rPr>
@@ -4664,18 +4664,11 @@
               <a:t>2</a:t>
             </a:r>
             <a:r>
-              <a:rPr sz="6600" b="0">
-                <a:latin typeface="Calibri Light" panose="020F0302020204030204" pitchFamily="34" charset="0"/>
-                <a:cs typeface="Calibri Light" panose="020F0302020204030204" pitchFamily="34" charset="0"/>
-              </a:rPr>
-              <a:t>0 </a:t>
-            </a:r>
-            <a:r>
               <a:rPr sz="6600" b="0" dirty="0">
                 <a:latin typeface="Calibri Light" panose="020F0302020204030204" pitchFamily="34" charset="0"/>
                 <a:cs typeface="Calibri Light" panose="020F0302020204030204" pitchFamily="34" charset="0"/>
               </a:rPr>
-              <a:t>Intro, Agenda, Status</a:t>
+              <a:t>0 Intro, Agenda, Status</a:t>
             </a:r>
           </a:p>
           <a:p>
@@ -4687,7 +4680,7 @@
               <a:t>14</a:t>
             </a:r>
             <a:r>
-              <a:rPr sz="6600" b="0">
+              <a:rPr sz="6600" b="0" dirty="0">
                 <a:latin typeface="Calibri Light" panose="020F0302020204030204" pitchFamily="34" charset="0"/>
                 <a:cs typeface="Calibri Light" panose="020F0302020204030204" pitchFamily="34" charset="0"/>
               </a:rPr>
@@ -4701,7 +4694,7 @@
               <a:t>2</a:t>
             </a:r>
             <a:r>
-              <a:rPr sz="6600" b="0">
+              <a:rPr sz="6600" b="0" dirty="0">
                 <a:latin typeface="Calibri Light" panose="020F0302020204030204" pitchFamily="34" charset="0"/>
                 <a:cs typeface="Calibri Light" panose="020F0302020204030204" pitchFamily="34" charset="0"/>
               </a:rPr>
@@ -4715,7 +4708,7 @@
               <a:t>14</a:t>
             </a:r>
             <a:r>
-              <a:rPr sz="6600" b="0">
+              <a:rPr sz="6600" b="0" dirty="0">
                 <a:latin typeface="Calibri Light" panose="020F0302020204030204" pitchFamily="34" charset="0"/>
                 <a:cs typeface="Calibri Light" panose="020F0302020204030204" pitchFamily="34" charset="0"/>
               </a:rPr>
@@ -4729,7 +4722,7 @@
               <a:t>25</a:t>
             </a:r>
             <a:r>
-              <a:rPr sz="6600" b="0">
+              <a:rPr sz="6600" b="0" dirty="0">
                 <a:latin typeface="Calibri Light" panose="020F0302020204030204" pitchFamily="34" charset="0"/>
                 <a:cs typeface="Calibri Light" panose="020F0302020204030204" pitchFamily="34" charset="0"/>
               </a:rPr>
@@ -4752,7 +4745,7 @@
               <a:t>14</a:t>
             </a:r>
             <a:r>
-              <a:rPr sz="6600" b="0">
+              <a:rPr sz="6600" b="0" dirty="0">
                 <a:latin typeface="Calibri Light" panose="020F0302020204030204" pitchFamily="34" charset="0"/>
                 <a:cs typeface="Calibri Light" panose="020F0302020204030204" pitchFamily="34" charset="0"/>
               </a:rPr>
@@ -4780,7 +4773,7 @@
               <a:t>4</a:t>
             </a:r>
             <a:r>
-              <a:rPr sz="6600" b="0">
+              <a:rPr sz="6600" b="0" dirty="0">
                 <a:latin typeface="Calibri Light" panose="020F0302020204030204" pitchFamily="34" charset="0"/>
                 <a:cs typeface="Calibri Light" panose="020F0302020204030204" pitchFamily="34" charset="0"/>
               </a:rPr>
@@ -4794,7 +4787,7 @@
               <a:t>30</a:t>
             </a:r>
             <a:r>
-              <a:rPr sz="6600" b="0">
+              <a:rPr sz="6600" b="0" dirty="0">
                 <a:latin typeface="Calibri Light" panose="020F0302020204030204" pitchFamily="34" charset="0"/>
                 <a:cs typeface="Calibri Light" panose="020F0302020204030204" pitchFamily="34" charset="0"/>
               </a:rPr>
@@ -4824,7 +4817,7 @@
               <a:t>4</a:t>
             </a:r>
             <a:r>
-              <a:rPr sz="6600" b="0">
+              <a:rPr sz="6600" b="0" dirty="0">
                 <a:latin typeface="Calibri Light" panose="020F0302020204030204" pitchFamily="34" charset="0"/>
                 <a:cs typeface="Calibri Light" panose="020F0302020204030204" pitchFamily="34" charset="0"/>
               </a:rPr>
@@ -4845,7 +4838,7 @@
               <a:t>0</a:t>
             </a:r>
             <a:r>
-              <a:rPr sz="6600" b="0">
+              <a:rPr sz="6600" b="0" dirty="0">
                 <a:latin typeface="Calibri Light" panose="020F0302020204030204" pitchFamily="34" charset="0"/>
                 <a:cs typeface="Calibri Light" panose="020F0302020204030204" pitchFamily="34" charset="0"/>
               </a:rPr>
@@ -4859,7 +4852,7 @@
               <a:t>4</a:t>
             </a:r>
             <a:r>
-              <a:rPr sz="6600" b="0">
+              <a:rPr sz="6600" b="0" dirty="0">
                 <a:latin typeface="Calibri Light" panose="020F0302020204030204" pitchFamily="34" charset="0"/>
                 <a:cs typeface="Calibri Light" panose="020F0302020204030204" pitchFamily="34" charset="0"/>
               </a:rPr>
@@ -4870,10 +4863,10 @@
                 <a:latin typeface="Calibri Light" panose="020F0302020204030204" pitchFamily="34" charset="0"/>
                 <a:cs typeface="Calibri Light" panose="020F0302020204030204" pitchFamily="34" charset="0"/>
               </a:rPr>
-              <a:t>50</a:t>
-            </a:r>
-            <a:r>
-              <a:rPr sz="6600" b="0">
+              <a:t>40</a:t>
+            </a:r>
+            <a:r>
+              <a:rPr sz="6600" b="0" dirty="0">
                 <a:latin typeface="Calibri Light" panose="020F0302020204030204" pitchFamily="34" charset="0"/>
                 <a:cs typeface="Calibri Light" panose="020F0302020204030204" pitchFamily="34" charset="0"/>
               </a:rPr>
@@ -4893,7 +4886,7 @@
                 <a:latin typeface="Calibri Light" panose="020F0302020204030204" pitchFamily="34" charset="0"/>
                 <a:cs typeface="Calibri Light" panose="020F0302020204030204" pitchFamily="34" charset="0"/>
               </a:rPr>
-              <a:t>14:50–15:00 </a:t>
+              <a:t>14:40–14:50 </a:t>
             </a:r>
             <a:r>
               <a:rPr lang="it-IT" sz="6600" b="0" dirty="0" err="1">
@@ -4913,7 +4906,7 @@
                 <a:latin typeface="Calibri Light" panose="020F0302020204030204" pitchFamily="34" charset="0"/>
                 <a:cs typeface="Calibri Light" panose="020F0302020204030204" pitchFamily="34" charset="0"/>
               </a:rPr>
-              <a:t>15:00–15:20 </a:t>
+              <a:t>14:50–15:10 </a:t>
             </a:r>
             <a:r>
               <a:rPr lang="it-IT" sz="6600" b="0" dirty="0" err="1">
@@ -4933,7 +4926,7 @@
                 <a:latin typeface="Calibri Light" panose="020F0302020204030204" pitchFamily="34" charset="0"/>
                 <a:cs typeface="Calibri Light" panose="020F0302020204030204" pitchFamily="34" charset="0"/>
               </a:rPr>
-              <a:t>15:20–15:35 </a:t>
+              <a:t>15:10–15:25 </a:t>
             </a:r>
             <a:r>
               <a:rPr lang="it-IT" sz="6600" b="0" dirty="0" err="1">
@@ -4947,21 +4940,16 @@
                 <a:latin typeface="Calibri Light" panose="020F0302020204030204" pitchFamily="34" charset="0"/>
                 <a:cs typeface="Calibri Light" panose="020F0302020204030204" pitchFamily="34" charset="0"/>
               </a:rPr>
-              <a:t> </a:t>
-            </a:r>
-            <a:r>
-              <a:rPr lang="it-IT" sz="6600" b="0" dirty="0" err="1">
-                <a:latin typeface="Calibri Light" panose="020F0302020204030204" pitchFamily="34" charset="0"/>
-                <a:cs typeface="Calibri Light" panose="020F0302020204030204" pitchFamily="34" charset="0"/>
-              </a:rPr>
-              <a:t>for</a:t>
-            </a:r>
+              <a:t> for DOTS</a:t>
+            </a:r>
+          </a:p>
+          <a:p>
             <a:r>
               <a:rPr lang="it-IT" sz="6600" b="0" dirty="0">
                 <a:latin typeface="Calibri Light" panose="020F0302020204030204" pitchFamily="34" charset="0"/>
                 <a:cs typeface="Calibri Light" panose="020F0302020204030204" pitchFamily="34" charset="0"/>
               </a:rPr>
-              <a:t> DOTS</a:t>
+              <a:t>15:25–15:35 AIF</a:t>
             </a:r>
           </a:p>
           <a:p>
@@ -4970,16 +4958,7 @@
                 <a:latin typeface="Calibri Light" panose="020F0302020204030204" pitchFamily="34" charset="0"/>
                 <a:cs typeface="Calibri Light" panose="020F0302020204030204" pitchFamily="34" charset="0"/>
               </a:rPr>
-              <a:t>15:35–15:45 AIF</a:t>
-            </a:r>
-          </a:p>
-          <a:p>
-            <a:r>
-              <a:rPr lang="it-IT" sz="6600" b="0" dirty="0">
-                <a:latin typeface="Calibri Light" panose="020F0302020204030204" pitchFamily="34" charset="0"/>
-                <a:cs typeface="Calibri Light" panose="020F0302020204030204" pitchFamily="34" charset="0"/>
-              </a:rPr>
-              <a:t>15:45–15:50 </a:t>
+              <a:t>15:35–15:50 </a:t>
             </a:r>
             <a:r>
               <a:rPr lang="it-IT" sz="6600" b="0" dirty="0" err="1">
@@ -5015,7 +4994,7 @@
           </a:prstGeom>
           <a:extLst>
             <a:ext uri="{C572A759-6A51-4108-AA02-DFA0A04FC94B}">
-              <ma14:wrappingTextBoxFlag xmlns="" xmlns:m="http://schemas.openxmlformats.org/officeDocument/2006/math" xmlns:a14="http://schemas.microsoft.com/office/drawing/2010/main" xmlns:ma14="http://schemas.microsoft.com/office/mac/drawingml/2011/main" val="1"/>
+              <ma14:wrappingTextBoxFlag xmlns:ma14="http://schemas.microsoft.com/office/mac/drawingml/2011/main" xmlns:a14="http://schemas.microsoft.com/office/drawing/2010/main" xmlns:m="http://schemas.openxmlformats.org/officeDocument/2006/math" xmlns="" val="1"/>
             </a:ext>
           </a:extLst>
         </p:spPr>
@@ -5051,7 +5030,7 @@
           </a:ln>
           <a:extLst>
             <a:ext uri="{C572A759-6A51-4108-AA02-DFA0A04FC94B}">
-              <ma14:wrappingTextBoxFlag xmlns="" xmlns:m="http://schemas.openxmlformats.org/officeDocument/2006/math" xmlns:a14="http://schemas.microsoft.com/office/drawing/2010/main" xmlns:ma14="http://schemas.microsoft.com/office/mac/drawingml/2011/main" val="1"/>
+              <ma14:wrappingTextBoxFlag xmlns:ma14="http://schemas.microsoft.com/office/mac/drawingml/2011/main" xmlns:a14="http://schemas.microsoft.com/office/drawing/2010/main" xmlns:m="http://schemas.openxmlformats.org/officeDocument/2006/math" xmlns="" val="1"/>
             </a:ext>
           </a:extLst>
         </p:spPr>
@@ -5194,7 +5173,7 @@
           </a:prstGeom>
           <a:extLst>
             <a:ext uri="{C572A759-6A51-4108-AA02-DFA0A04FC94B}">
-              <ma14:wrappingTextBoxFlag xmlns="" xmlns:m="http://schemas.openxmlformats.org/officeDocument/2006/math" xmlns:a14="http://schemas.microsoft.com/office/drawing/2010/main" xmlns:ma14="http://schemas.microsoft.com/office/mac/drawingml/2011/main" val="1"/>
+              <ma14:wrappingTextBoxFlag xmlns:ma14="http://schemas.microsoft.com/office/mac/drawingml/2011/main" xmlns:a14="http://schemas.microsoft.com/office/drawing/2010/main" xmlns:m="http://schemas.openxmlformats.org/officeDocument/2006/math" xmlns="" val="1"/>
             </a:ext>
           </a:extLst>
         </p:spPr>
@@ -5230,7 +5209,7 @@
           </a:ln>
           <a:extLst>
             <a:ext uri="{C572A759-6A51-4108-AA02-DFA0A04FC94B}">
-              <ma14:wrappingTextBoxFlag xmlns="" xmlns:m="http://schemas.openxmlformats.org/officeDocument/2006/math" xmlns:a14="http://schemas.microsoft.com/office/drawing/2010/main" xmlns:ma14="http://schemas.microsoft.com/office/mac/drawingml/2011/main" val="1"/>
+              <ma14:wrappingTextBoxFlag xmlns:ma14="http://schemas.microsoft.com/office/mac/drawingml/2011/main" xmlns:a14="http://schemas.microsoft.com/office/drawing/2010/main" xmlns:m="http://schemas.openxmlformats.org/officeDocument/2006/math" xmlns="" val="1"/>
             </a:ext>
           </a:extLst>
         </p:spPr>
@@ -6095,7 +6074,7 @@
           </a:ln>
           <a:extLst>
             <a:ext uri="{C572A759-6A51-4108-AA02-DFA0A04FC94B}">
-              <ma14:wrappingTextBoxFlag xmlns="" xmlns:m="http://schemas.openxmlformats.org/officeDocument/2006/math" xmlns:a14="http://schemas.microsoft.com/office/drawing/2010/main" xmlns:ma14="http://schemas.microsoft.com/office/mac/drawingml/2011/main" val="1"/>
+              <ma14:wrappingTextBoxFlag xmlns:ma14="http://schemas.microsoft.com/office/mac/drawingml/2011/main" xmlns:a14="http://schemas.microsoft.com/office/drawing/2010/main" xmlns:m="http://schemas.openxmlformats.org/officeDocument/2006/math" xmlns="" val="1"/>
             </a:ext>
           </a:extLst>
         </p:spPr>
@@ -6154,7 +6133,7 @@
           </a:ln>
           <a:extLst>
             <a:ext uri="{C572A759-6A51-4108-AA02-DFA0A04FC94B}">
-              <ma14:wrappingTextBoxFlag xmlns="" xmlns:m="http://schemas.openxmlformats.org/officeDocument/2006/math" xmlns:a14="http://schemas.microsoft.com/office/drawing/2010/main" xmlns:ma14="http://schemas.microsoft.com/office/mac/drawingml/2011/main" val="1"/>
+              <ma14:wrappingTextBoxFlag xmlns:ma14="http://schemas.microsoft.com/office/mac/drawingml/2011/main" xmlns:a14="http://schemas.microsoft.com/office/drawing/2010/main" xmlns:m="http://schemas.openxmlformats.org/officeDocument/2006/math" xmlns="" val="1"/>
             </a:ext>
           </a:extLst>
         </p:spPr>

</xml_diff>